<commit_message>
merging with the new branch.
</commit_message>
<xml_diff>
--- a/Git.pptx
+++ b/Git.pptx
@@ -7,6 +7,10 @@
   <p:sldIdLst>
     <p:sldId id="256" r:id="rId2"/>
     <p:sldId id="257" r:id="rId3"/>
+    <p:sldId id="258" r:id="rId4"/>
+    <p:sldId id="259" r:id="rId5"/>
+    <p:sldId id="260" r:id="rId6"/>
+    <p:sldId id="261" r:id="rId7"/>
   </p:sldIdLst>
   <p:sldSz cx="9144000" cy="6858000" type="screen4x3"/>
   <p:notesSz cx="6858000" cy="9144000"/>
@@ -3185,6 +3189,13 @@
   <p:clrMapOvr>
     <a:masterClrMapping/>
   </p:clrMapOvr>
+  <p:timing>
+    <p:tnLst>
+      <p:par>
+        <p:cTn id="1" dur="indefinite" restart="never" nodeType="tmRoot"/>
+      </p:par>
+    </p:tnLst>
+  </p:timing>
 </p:sld>
 </file>
 
@@ -3221,10 +3232,18 @@
           <a:lstStyle/>
           <a:p>
             <a:r>
-              <a:rPr lang="en-US" dirty="0" smtClean="0"/>
+              <a:rPr lang="en-US" dirty="0" smtClean="0">
+                <a:solidFill>
+                  <a:srgbClr val="FF0000"/>
+                </a:solidFill>
+              </a:rPr>
               <a:t>Content</a:t>
             </a:r>
-            <a:endParaRPr lang="en-US" dirty="0"/>
+            <a:endParaRPr lang="en-US" dirty="0">
+              <a:solidFill>
+                <a:srgbClr val="FF0000"/>
+              </a:solidFill>
+            </a:endParaRPr>
           </a:p>
         </p:txBody>
       </p:sp>
@@ -3324,6 +3343,533 @@
     <p:extLst>
       <p:ext uri="{BB962C8B-B14F-4D97-AF65-F5344CB8AC3E}">
         <p14:creationId xmlns:p14="http://schemas.microsoft.com/office/powerpoint/2010/main" val="659531044"/>
+      </p:ext>
+    </p:extLst>
+  </p:cSld>
+  <p:clrMapOvr>
+    <a:masterClrMapping/>
+  </p:clrMapOvr>
+  <p:timing>
+    <p:tnLst>
+      <p:par>
+        <p:cTn id="1" dur="indefinite" restart="never" nodeType="tmRoot"/>
+      </p:par>
+    </p:tnLst>
+  </p:timing>
+</p:sld>
+</file>
+
+<file path=ppt/slides/slide3.xml><?xml version="1.0" encoding="utf-8"?>
+<p:sld xmlns:a="http://schemas.openxmlformats.org/drawingml/2006/main" xmlns:r="http://schemas.openxmlformats.org/officeDocument/2006/relationships" xmlns:p="http://schemas.openxmlformats.org/presentationml/2006/main">
+  <p:cSld>
+    <p:spTree>
+      <p:nvGrpSpPr>
+        <p:cNvPr id="1" name=""/>
+        <p:cNvGrpSpPr/>
+        <p:nvPr/>
+      </p:nvGrpSpPr>
+      <p:grpSpPr>
+        <a:xfrm>
+          <a:off x="0" y="0"/>
+          <a:ext cx="0" cy="0"/>
+          <a:chOff x="0" y="0"/>
+          <a:chExt cx="0" cy="0"/>
+        </a:xfrm>
+      </p:grpSpPr>
+      <p:sp>
+        <p:nvSpPr>
+          <p:cNvPr id="2" name="Title 1"/>
+          <p:cNvSpPr>
+            <a:spLocks noGrp="1"/>
+          </p:cNvSpPr>
+          <p:nvPr>
+            <p:ph type="title"/>
+          </p:nvPr>
+        </p:nvSpPr>
+        <p:spPr/>
+        <p:txBody>
+          <a:bodyPr>
+            <a:normAutofit/>
+          </a:bodyPr>
+          <a:lstStyle/>
+          <a:p>
+            <a:r>
+              <a:rPr lang="en-US" sz="4800" i="1" dirty="0" smtClean="0">
+                <a:solidFill>
+                  <a:srgbClr val="FF0000"/>
+                </a:solidFill>
+                <a:effectLst>
+                  <a:outerShdw blurRad="38100" dist="38100" dir="2700000" algn="tl">
+                    <a:srgbClr val="000000">
+                      <a:alpha val="43137"/>
+                    </a:srgbClr>
+                  </a:outerShdw>
+                </a:effectLst>
+                <a:latin typeface="Bell MT" panose="02020503060305020303" pitchFamily="18" charset="0"/>
+              </a:rPr>
+              <a:t>git in nutshell</a:t>
+            </a:r>
+            <a:endParaRPr lang="en-US" sz="4800" dirty="0">
+              <a:solidFill>
+                <a:srgbClr val="FF0000"/>
+              </a:solidFill>
+              <a:effectLst>
+                <a:outerShdw blurRad="38100" dist="38100" dir="2700000" algn="tl">
+                  <a:srgbClr val="000000">
+                    <a:alpha val="43137"/>
+                  </a:srgbClr>
+                </a:outerShdw>
+              </a:effectLst>
+            </a:endParaRPr>
+          </a:p>
+        </p:txBody>
+      </p:sp>
+      <p:sp>
+        <p:nvSpPr>
+          <p:cNvPr id="3" name="Content Placeholder 2"/>
+          <p:cNvSpPr>
+            <a:spLocks noGrp="1"/>
+          </p:cNvSpPr>
+          <p:nvPr>
+            <p:ph idx="1"/>
+          </p:nvPr>
+        </p:nvSpPr>
+        <p:spPr/>
+        <p:txBody>
+          <a:bodyPr/>
+          <a:lstStyle/>
+          <a:p>
+            <a:r>
+              <a:rPr lang="en-US" dirty="0"/>
+              <a:t>Distributed </a:t>
+            </a:r>
+            <a:r>
+              <a:rPr lang="en-US" dirty="0" smtClean="0"/>
+              <a:t>development</a:t>
+            </a:r>
+          </a:p>
+          <a:p>
+            <a:r>
+              <a:rPr lang="en-US" dirty="0"/>
+              <a:t>Complex </a:t>
+            </a:r>
+            <a:r>
+              <a:rPr lang="en-US" dirty="0" smtClean="0"/>
+              <a:t>merges</a:t>
+            </a:r>
+          </a:p>
+          <a:p>
+            <a:r>
+              <a:rPr lang="en-US" dirty="0" smtClean="0"/>
+              <a:t>Very fast</a:t>
+            </a:r>
+          </a:p>
+          <a:p>
+            <a:endParaRPr lang="en-US" dirty="0"/>
+          </a:p>
+        </p:txBody>
+      </p:sp>
+    </p:spTree>
+    <p:extLst>
+      <p:ext uri="{BB962C8B-B14F-4D97-AF65-F5344CB8AC3E}">
+        <p14:creationId xmlns:p14="http://schemas.microsoft.com/office/powerpoint/2010/main" val="1293869782"/>
+      </p:ext>
+    </p:extLst>
+  </p:cSld>
+  <p:clrMapOvr>
+    <a:masterClrMapping/>
+  </p:clrMapOvr>
+  <p:timing>
+    <p:tnLst>
+      <p:par>
+        <p:cTn id="1" dur="indefinite" restart="never" nodeType="tmRoot"/>
+      </p:par>
+    </p:tnLst>
+  </p:timing>
+</p:sld>
+</file>
+
+<file path=ppt/slides/slide4.xml><?xml version="1.0" encoding="utf-8"?>
+<p:sld xmlns:a="http://schemas.openxmlformats.org/drawingml/2006/main" xmlns:r="http://schemas.openxmlformats.org/officeDocument/2006/relationships" xmlns:p="http://schemas.openxmlformats.org/presentationml/2006/main">
+  <p:cSld>
+    <p:spTree>
+      <p:nvGrpSpPr>
+        <p:cNvPr id="1" name=""/>
+        <p:cNvGrpSpPr/>
+        <p:nvPr/>
+      </p:nvGrpSpPr>
+      <p:grpSpPr>
+        <a:xfrm>
+          <a:off x="0" y="0"/>
+          <a:ext cx="0" cy="0"/>
+          <a:chOff x="0" y="0"/>
+          <a:chExt cx="0" cy="0"/>
+        </a:xfrm>
+      </p:grpSpPr>
+      <p:sp>
+        <p:nvSpPr>
+          <p:cNvPr id="2" name="Title 1"/>
+          <p:cNvSpPr>
+            <a:spLocks noGrp="1"/>
+          </p:cNvSpPr>
+          <p:nvPr>
+            <p:ph type="title"/>
+          </p:nvPr>
+        </p:nvSpPr>
+        <p:spPr/>
+        <p:txBody>
+          <a:bodyPr>
+            <a:normAutofit/>
+          </a:bodyPr>
+          <a:lstStyle/>
+          <a:p>
+            <a:r>
+              <a:rPr lang="en-US" sz="4800" i="1" dirty="0" smtClean="0">
+                <a:solidFill>
+                  <a:srgbClr val="FF0000"/>
+                </a:solidFill>
+                <a:effectLst>
+                  <a:outerShdw blurRad="38100" dist="38100" dir="2700000" algn="tl">
+                    <a:srgbClr val="000000">
+                      <a:alpha val="43137"/>
+                    </a:srgbClr>
+                  </a:outerShdw>
+                </a:effectLst>
+                <a:latin typeface="Bell MT" panose="02020503060305020303" pitchFamily="18" charset="0"/>
+              </a:rPr>
+              <a:t>git basics</a:t>
+            </a:r>
+            <a:endParaRPr lang="en-US" sz="4800" dirty="0">
+              <a:solidFill>
+                <a:srgbClr val="FF0000"/>
+              </a:solidFill>
+              <a:effectLst>
+                <a:outerShdw blurRad="38100" dist="38100" dir="2700000" algn="tl">
+                  <a:srgbClr val="000000">
+                    <a:alpha val="43137"/>
+                  </a:srgbClr>
+                </a:outerShdw>
+              </a:effectLst>
+            </a:endParaRPr>
+          </a:p>
+        </p:txBody>
+      </p:sp>
+      <p:sp>
+        <p:nvSpPr>
+          <p:cNvPr id="3" name="Content Placeholder 2"/>
+          <p:cNvSpPr>
+            <a:spLocks noGrp="1"/>
+          </p:cNvSpPr>
+          <p:nvPr>
+            <p:ph idx="1"/>
+          </p:nvPr>
+        </p:nvSpPr>
+        <p:spPr>
+          <a:xfrm>
+            <a:off x="457200" y="2057400"/>
+            <a:ext cx="8229600" cy="3276600"/>
+          </a:xfrm>
+        </p:spPr>
+        <p:txBody>
+          <a:bodyPr/>
+          <a:lstStyle/>
+          <a:p>
+            <a:r>
+              <a:rPr lang="en-US" dirty="0" smtClean="0"/>
+              <a:t>Cloning repositories.</a:t>
+            </a:r>
+          </a:p>
+          <a:p>
+            <a:r>
+              <a:rPr lang="en-US" dirty="0" smtClean="0"/>
+              <a:t>Commits and stashing.</a:t>
+            </a:r>
+          </a:p>
+          <a:p>
+            <a:r>
+              <a:rPr lang="en-US" dirty="0" smtClean="0"/>
+              <a:t>Push &amp; Pull.</a:t>
+            </a:r>
+          </a:p>
+          <a:p>
+            <a:r>
+              <a:rPr lang="en-US" dirty="0" smtClean="0"/>
+              <a:t>Merging updates.</a:t>
+            </a:r>
+            <a:endParaRPr lang="en-US" dirty="0"/>
+          </a:p>
+        </p:txBody>
+      </p:sp>
+    </p:spTree>
+    <p:extLst>
+      <p:ext uri="{BB962C8B-B14F-4D97-AF65-F5344CB8AC3E}">
+        <p14:creationId xmlns:p14="http://schemas.microsoft.com/office/powerpoint/2010/main" val="1225857582"/>
+      </p:ext>
+    </p:extLst>
+  </p:cSld>
+  <p:clrMapOvr>
+    <a:masterClrMapping/>
+  </p:clrMapOvr>
+  <p:timing>
+    <p:tnLst>
+      <p:par>
+        <p:cTn id="1" dur="indefinite" restart="never" nodeType="tmRoot"/>
+      </p:par>
+    </p:tnLst>
+  </p:timing>
+</p:sld>
+</file>
+
+<file path=ppt/slides/slide5.xml><?xml version="1.0" encoding="utf-8"?>
+<p:sld xmlns:a="http://schemas.openxmlformats.org/drawingml/2006/main" xmlns:r="http://schemas.openxmlformats.org/officeDocument/2006/relationships" xmlns:p="http://schemas.openxmlformats.org/presentationml/2006/main">
+  <p:cSld>
+    <p:spTree>
+      <p:nvGrpSpPr>
+        <p:cNvPr id="1" name=""/>
+        <p:cNvGrpSpPr/>
+        <p:nvPr/>
+      </p:nvGrpSpPr>
+      <p:grpSpPr>
+        <a:xfrm>
+          <a:off x="0" y="0"/>
+          <a:ext cx="0" cy="0"/>
+          <a:chOff x="0" y="0"/>
+          <a:chExt cx="0" cy="0"/>
+        </a:xfrm>
+      </p:grpSpPr>
+      <p:sp>
+        <p:nvSpPr>
+          <p:cNvPr id="2" name="Title 1"/>
+          <p:cNvSpPr>
+            <a:spLocks noGrp="1"/>
+          </p:cNvSpPr>
+          <p:nvPr>
+            <p:ph type="title"/>
+          </p:nvPr>
+        </p:nvSpPr>
+        <p:spPr/>
+        <p:txBody>
+          <a:bodyPr>
+            <a:normAutofit/>
+          </a:bodyPr>
+          <a:lstStyle/>
+          <a:p>
+            <a:r>
+              <a:rPr lang="en-US" sz="4800" i="1" dirty="0" smtClean="0">
+                <a:solidFill>
+                  <a:srgbClr val="FF0000"/>
+                </a:solidFill>
+                <a:effectLst>
+                  <a:outerShdw blurRad="38100" dist="38100" dir="2700000" algn="tl">
+                    <a:srgbClr val="000000">
+                      <a:alpha val="43137"/>
+                    </a:srgbClr>
+                  </a:outerShdw>
+                </a:effectLst>
+                <a:latin typeface="Bell MT" panose="02020503060305020303" pitchFamily="18" charset="0"/>
+              </a:rPr>
+              <a:t>git basics</a:t>
+            </a:r>
+            <a:endParaRPr lang="en-US" sz="4800" dirty="0">
+              <a:solidFill>
+                <a:srgbClr val="FF0000"/>
+              </a:solidFill>
+              <a:effectLst>
+                <a:outerShdw blurRad="38100" dist="38100" dir="2700000" algn="tl">
+                  <a:srgbClr val="000000">
+                    <a:alpha val="43137"/>
+                  </a:srgbClr>
+                </a:outerShdw>
+              </a:effectLst>
+            </a:endParaRPr>
+          </a:p>
+        </p:txBody>
+      </p:sp>
+      <p:sp>
+        <p:nvSpPr>
+          <p:cNvPr id="3" name="Content Placeholder 2"/>
+          <p:cNvSpPr>
+            <a:spLocks noGrp="1"/>
+          </p:cNvSpPr>
+          <p:nvPr>
+            <p:ph idx="1"/>
+          </p:nvPr>
+        </p:nvSpPr>
+        <p:spPr>
+          <a:xfrm>
+            <a:off x="457200" y="2286000"/>
+            <a:ext cx="8229600" cy="3505200"/>
+          </a:xfrm>
+        </p:spPr>
+        <p:txBody>
+          <a:bodyPr/>
+          <a:lstStyle/>
+          <a:p>
+            <a:r>
+              <a:rPr lang="en-US" dirty="0" smtClean="0"/>
+              <a:t>Viewing Tree.</a:t>
+            </a:r>
+          </a:p>
+          <a:p>
+            <a:r>
+              <a:rPr lang="en-US" dirty="0" smtClean="0"/>
+              <a:t>Rebase/Check out node.</a:t>
+            </a:r>
+          </a:p>
+        </p:txBody>
+      </p:sp>
+    </p:spTree>
+    <p:extLst>
+      <p:ext uri="{BB962C8B-B14F-4D97-AF65-F5344CB8AC3E}">
+        <p14:creationId xmlns:p14="http://schemas.microsoft.com/office/powerpoint/2010/main" val="2769596831"/>
+      </p:ext>
+    </p:extLst>
+  </p:cSld>
+  <p:clrMapOvr>
+    <a:masterClrMapping/>
+  </p:clrMapOvr>
+  <p:timing>
+    <p:tnLst>
+      <p:par>
+        <p:cTn id="1" dur="indefinite" restart="never" nodeType="tmRoot"/>
+      </p:par>
+    </p:tnLst>
+  </p:timing>
+</p:sld>
+</file>
+
+<file path=ppt/slides/slide6.xml><?xml version="1.0" encoding="utf-8"?>
+<p:sld xmlns:a="http://schemas.openxmlformats.org/drawingml/2006/main" xmlns:r="http://schemas.openxmlformats.org/officeDocument/2006/relationships" xmlns:p="http://schemas.openxmlformats.org/presentationml/2006/main">
+  <p:cSld>
+    <p:spTree>
+      <p:nvGrpSpPr>
+        <p:cNvPr id="1" name=""/>
+        <p:cNvGrpSpPr/>
+        <p:nvPr/>
+      </p:nvGrpSpPr>
+      <p:grpSpPr>
+        <a:xfrm>
+          <a:off x="0" y="0"/>
+          <a:ext cx="0" cy="0"/>
+          <a:chOff x="0" y="0"/>
+          <a:chExt cx="0" cy="0"/>
+        </a:xfrm>
+      </p:grpSpPr>
+      <p:sp>
+        <p:nvSpPr>
+          <p:cNvPr id="2" name="Title 1"/>
+          <p:cNvSpPr>
+            <a:spLocks noGrp="1"/>
+          </p:cNvSpPr>
+          <p:nvPr>
+            <p:ph type="title"/>
+          </p:nvPr>
+        </p:nvSpPr>
+        <p:spPr/>
+        <p:txBody>
+          <a:bodyPr>
+            <a:normAutofit/>
+          </a:bodyPr>
+          <a:lstStyle/>
+          <a:p>
+            <a:r>
+              <a:rPr lang="en-US" sz="4800" i="1" dirty="0" smtClean="0">
+                <a:solidFill>
+                  <a:srgbClr val="FF0000"/>
+                </a:solidFill>
+                <a:effectLst>
+                  <a:outerShdw blurRad="38100" dist="38100" dir="2700000" algn="tl">
+                    <a:srgbClr val="000000">
+                      <a:alpha val="43137"/>
+                    </a:srgbClr>
+                  </a:outerShdw>
+                </a:effectLst>
+                <a:latin typeface="Bell MT" panose="02020503060305020303" pitchFamily="18" charset="0"/>
+              </a:rPr>
+              <a:t>git  branches </a:t>
+            </a:r>
+            <a:r>
+              <a:rPr lang="en-US" sz="4800" i="1" dirty="0">
+                <a:solidFill>
+                  <a:srgbClr val="FF0000"/>
+                </a:solidFill>
+                <a:effectLst>
+                  <a:outerShdw blurRad="38100" dist="38100" dir="2700000" algn="tl">
+                    <a:srgbClr val="000000">
+                      <a:alpha val="43137"/>
+                    </a:srgbClr>
+                  </a:outerShdw>
+                </a:effectLst>
+                <a:latin typeface="Bell MT" panose="02020503060305020303" pitchFamily="18" charset="0"/>
+              </a:rPr>
+              <a:t>&amp; tags</a:t>
+            </a:r>
+          </a:p>
+        </p:txBody>
+      </p:sp>
+      <p:sp>
+        <p:nvSpPr>
+          <p:cNvPr id="3" name="Content Placeholder 2"/>
+          <p:cNvSpPr>
+            <a:spLocks noGrp="1"/>
+          </p:cNvSpPr>
+          <p:nvPr>
+            <p:ph idx="1"/>
+          </p:nvPr>
+        </p:nvSpPr>
+        <p:spPr/>
+        <p:txBody>
+          <a:bodyPr/>
+          <a:lstStyle/>
+          <a:p>
+            <a:r>
+              <a:rPr lang="en-US" dirty="0" smtClean="0"/>
+              <a:t>Creating a branch on local repos</a:t>
+            </a:r>
+          </a:p>
+          <a:p>
+            <a:r>
+              <a:rPr lang="en-US" dirty="0" smtClean="0"/>
+              <a:t>Doing some changes.</a:t>
+            </a:r>
+          </a:p>
+          <a:p>
+            <a:r>
+              <a:rPr lang="en-US" dirty="0" smtClean="0"/>
+              <a:t>Pushing branch to remote.</a:t>
+            </a:r>
+          </a:p>
+          <a:p>
+            <a:r>
+              <a:rPr lang="en-US" dirty="0" smtClean="0"/>
+              <a:t>Pull branch.</a:t>
+            </a:r>
+          </a:p>
+          <a:p>
+            <a:r>
+              <a:rPr lang="en-US" dirty="0" smtClean="0"/>
+              <a:t>Switch to branch.</a:t>
+            </a:r>
+          </a:p>
+          <a:p>
+            <a:r>
+              <a:rPr lang="en-US" dirty="0" smtClean="0"/>
+              <a:t>Merging branches.</a:t>
+            </a:r>
+          </a:p>
+          <a:p>
+            <a:r>
+              <a:rPr lang="en-US" dirty="0" smtClean="0"/>
+              <a:t>Differences between tags and branches.</a:t>
+            </a:r>
+            <a:endParaRPr lang="en-US" dirty="0"/>
+          </a:p>
+        </p:txBody>
+      </p:sp>
+    </p:spTree>
+    <p:extLst>
+      <p:ext uri="{BB962C8B-B14F-4D97-AF65-F5344CB8AC3E}">
+        <p14:creationId xmlns:p14="http://schemas.microsoft.com/office/powerpoint/2010/main" val="2769596831"/>
       </p:ext>
     </p:extLst>
   </p:cSld>

</xml_diff>